<commit_message>
tidying up the ranking code
</commit_message>
<xml_diff>
--- a/data-science-london.pptx
+++ b/data-science-london.pptx
@@ -51,7 +51,7 @@
     <p:sldId id="273" r:id="rId42"/>
     <p:sldId id="269" r:id="rId43"/>
     <p:sldId id="313" r:id="rId44"/>
-    <p:sldId id="314" r:id="rId45"/>
+    <p:sldId id="321" r:id="rId45"/>
     <p:sldId id="311" r:id="rId46"/>
     <p:sldId id="315" r:id="rId47"/>
     <p:sldId id="316" r:id="rId48"/>
@@ -3050,11 +3050,7 @@
             </a:r>
             <a:r>
               <a:rPr lang="en-US" baseline="0" dirty="0" smtClean="0"/>
-              <a:t> </a:t>
-            </a:r>
-            <a:r>
-              <a:rPr lang="en-US" baseline="0" smtClean="0"/>
-              <a:t>of winning</a:t>
+              <a:t> of winning</a:t>
             </a:r>
             <a:endParaRPr lang="en-US" dirty="0"/>
           </a:p>
@@ -3510,11 +3506,11 @@
           <a:p>
             <a:r>
               <a:rPr lang="en-US" dirty="0" smtClean="0"/>
-              <a:t>If you lose then you get massively </a:t>
-            </a:r>
-            <a:r>
-              <a:rPr lang="en-US" dirty="0" err="1" smtClean="0"/>
-              <a:t>penalised</a:t>
+              <a:t>Barcelona are missing, they won early games when</a:t>
+            </a:r>
+            <a:r>
+              <a:rPr lang="en-US" baseline="0" dirty="0" smtClean="0"/>
+              <a:t> everyone was closely ranked but then lost points late on</a:t>
             </a:r>
             <a:endParaRPr lang="en-US" dirty="0"/>
           </a:p>
@@ -3693,11 +3689,11 @@
           <a:p>
             <a:r>
               <a:rPr lang="en-US" dirty="0" smtClean="0"/>
-              <a:t>If you lose then you get massively </a:t>
-            </a:r>
-            <a:r>
-              <a:rPr lang="en-US" dirty="0" err="1" smtClean="0"/>
-              <a:t>penalised</a:t>
+              <a:t>Barcelona are missing, they won early games when</a:t>
+            </a:r>
+            <a:r>
+              <a:rPr lang="en-US" baseline="0" dirty="0" smtClean="0"/>
+              <a:t> everyone was closely ranked but then lost points late on</a:t>
             </a:r>
             <a:endParaRPr lang="en-US" dirty="0"/>
           </a:p>
@@ -14315,7 +14311,7 @@
         <p:spPr>
           <a:xfrm>
             <a:off x="0" y="18139"/>
-            <a:ext cx="9292623" cy="5940087"/>
+            <a:ext cx="9292623" cy="5816978"/>
           </a:xfrm>
           <a:prstGeom prst="rect">
             <a:avLst/>
@@ -14329,21 +14325,21 @@
           <a:lstStyle/>
           <a:p>
             <a:r>
-              <a:rPr lang="en-US" sz="1900" dirty="0" smtClean="0">
+              <a:rPr lang="en-US" dirty="0" smtClean="0">
                 <a:latin typeface="Monaco"/>
                 <a:cs typeface="Monaco"/>
               </a:rPr>
               <a:t>(</a:t>
             </a:r>
             <a:r>
-              <a:rPr lang="en-US" sz="1900" dirty="0" err="1" smtClean="0">
+              <a:rPr lang="en-US" dirty="0" err="1" smtClean="0">
                 <a:latin typeface="Monaco"/>
                 <a:cs typeface="Monaco"/>
               </a:rPr>
               <a:t>defn</a:t>
             </a:r>
             <a:r>
-              <a:rPr lang="en-US" sz="1900" dirty="0" smtClean="0">
+              <a:rPr lang="en-US" dirty="0" smtClean="0">
                 <a:latin typeface="Monaco"/>
                 <a:cs typeface="Monaco"/>
               </a:rPr>
@@ -14352,7 +14348,7 @@
           </a:p>
           <a:p>
             <a:r>
-              <a:rPr lang="en-US" sz="1900" dirty="0" smtClean="0">
+              <a:rPr lang="en-US" dirty="0" smtClean="0">
                 <a:latin typeface="Monaco"/>
                 <a:cs typeface="Monaco"/>
               </a:rPr>
@@ -14361,7 +14357,7 @@
           </a:p>
           <a:p>
             <a:r>
-              <a:rPr lang="en-US" sz="1900" dirty="0" smtClean="0">
+              <a:rPr lang="en-US" dirty="0" smtClean="0">
                 <a:latin typeface="Monaco"/>
                 <a:cs typeface="Monaco"/>
               </a:rPr>
@@ -14370,152 +14366,59 @@
           </a:p>
           <a:p>
             <a:r>
-              <a:rPr lang="en-US" sz="1900" dirty="0" smtClean="0">
+              <a:rPr lang="en-US" dirty="0" smtClean="0">
                 <a:latin typeface="Monaco"/>
                 <a:cs typeface="Monaco"/>
               </a:rPr>
               <a:t>        (math/</a:t>
             </a:r>
             <a:r>
-              <a:rPr lang="en-US" sz="1900" dirty="0" err="1" smtClean="0">
+              <a:rPr lang="en-US" dirty="0" err="1" smtClean="0">
                 <a:latin typeface="Monaco"/>
                 <a:cs typeface="Monaco"/>
               </a:rPr>
               <a:t>expt</a:t>
             </a:r>
             <a:r>
-              <a:rPr lang="en-US" sz="1900" dirty="0" smtClean="0">
+              <a:rPr lang="en-US" dirty="0" smtClean="0">
                 <a:latin typeface="Monaco"/>
                 <a:cs typeface="Monaco"/>
               </a:rPr>
-              <a:t> 10 (/ (- opponent-ranking my-ranking) </a:t>
-            </a:r>
-          </a:p>
-          <a:p>
-            <a:r>
-              <a:rPr lang="en-US" sz="1900" dirty="0" smtClean="0">
-                <a:latin typeface="Monaco"/>
-                <a:cs typeface="Monaco"/>
-              </a:rPr>
-              <a:t>                         400)))))</a:t>
-            </a:r>
-          </a:p>
-          <a:p>
-            <a:r>
-              <a:rPr lang="en-US" sz="1900" dirty="0" smtClean="0">
-                <a:latin typeface="Monaco"/>
-                <a:cs typeface="Monaco"/>
-              </a:rPr>
-              <a:t>(</a:t>
-            </a:r>
-            <a:r>
-              <a:rPr lang="en-US" sz="1900" dirty="0" err="1" smtClean="0">
-                <a:latin typeface="Monaco"/>
-                <a:cs typeface="Monaco"/>
-              </a:rPr>
-              <a:t>defn</a:t>
-            </a:r>
-            <a:r>
-              <a:rPr lang="en-US" sz="1900" dirty="0" smtClean="0">
-                <a:latin typeface="Monaco"/>
-                <a:cs typeface="Monaco"/>
-              </a:rPr>
-              <a:t> ranking-after-win</a:t>
-            </a:r>
-          </a:p>
-          <a:p>
-            <a:r>
-              <a:rPr lang="en-US" sz="1900" dirty="0" smtClean="0">
-                <a:latin typeface="Monaco"/>
-                <a:cs typeface="Monaco"/>
-              </a:rPr>
-              <a:t>  [{ ranking :ranking </a:t>
-            </a:r>
-          </a:p>
-          <a:p>
-            <a:r>
-              <a:rPr lang="en-US" sz="1900" dirty="0">
-                <a:latin typeface="Monaco"/>
-                <a:cs typeface="Monaco"/>
-              </a:rPr>
-              <a:t> </a:t>
-            </a:r>
-            <a:r>
-              <a:rPr lang="en-US" sz="1900" dirty="0" smtClean="0">
-                <a:latin typeface="Monaco"/>
-                <a:cs typeface="Monaco"/>
-              </a:rPr>
-              <a:t>    opponent-ranking :opponent-ranking</a:t>
-            </a:r>
-          </a:p>
-          <a:p>
-            <a:r>
-              <a:rPr lang="en-US" sz="1900" dirty="0" smtClean="0">
-                <a:latin typeface="Monaco"/>
-                <a:cs typeface="Monaco"/>
-              </a:rPr>
-              <a:t>     importance :importance}]</a:t>
-            </a:r>
-          </a:p>
-          <a:p>
-            <a:r>
-              <a:rPr lang="en-US" sz="1900" dirty="0" smtClean="0">
-                <a:latin typeface="Monaco"/>
-                <a:cs typeface="Monaco"/>
-              </a:rPr>
-              <a:t>  (+ ranking</a:t>
-            </a:r>
-          </a:p>
-          <a:p>
-            <a:r>
-              <a:rPr lang="en-US" sz="1900" dirty="0" smtClean="0">
-                <a:latin typeface="Monaco"/>
-                <a:cs typeface="Monaco"/>
-              </a:rPr>
-              <a:t>     (* importance</a:t>
-            </a:r>
-          </a:p>
-          <a:p>
-            <a:r>
-              <a:rPr lang="en-US" sz="1900" dirty="0" smtClean="0">
-                <a:latin typeface="Monaco"/>
-                <a:cs typeface="Monaco"/>
-              </a:rPr>
-              <a:t>        (- 1 (expected ranking opponent-ranking) ))))</a:t>
-            </a:r>
-          </a:p>
-          <a:p>
-            <a:endParaRPr lang="en-US" sz="1900" dirty="0" smtClean="0">
+              <a:t> 10 (/ (- opponent-ranking my-ranking) 400)))))</a:t>
+            </a:r>
+          </a:p>
+          <a:p>
+            <a:endParaRPr lang="en-US" sz="1200" dirty="0">
               <a:latin typeface="Monaco"/>
               <a:cs typeface="Monaco"/>
             </a:endParaRPr>
           </a:p>
           <a:p>
             <a:r>
-              <a:rPr lang="en-US" sz="1900" dirty="0" smtClean="0">
+              <a:rPr lang="en-US" dirty="0" smtClean="0">
                 <a:latin typeface="Monaco"/>
                 <a:cs typeface="Monaco"/>
               </a:rPr>
               <a:t>(</a:t>
             </a:r>
             <a:r>
-              <a:rPr lang="en-US" sz="1900" dirty="0" err="1" smtClean="0">
+              <a:rPr lang="en-US" dirty="0" err="1" smtClean="0">
                 <a:latin typeface="Monaco"/>
                 <a:cs typeface="Monaco"/>
               </a:rPr>
               <a:t>defn</a:t>
             </a:r>
             <a:r>
-              <a:rPr lang="en-US" sz="1900" dirty="0" smtClean="0">
+              <a:rPr lang="en-US" dirty="0" smtClean="0">
                 <a:latin typeface="Monaco"/>
                 <a:cs typeface="Monaco"/>
               </a:rPr>
-              <a:t> ranking-after-loss</a:t>
-            </a:r>
-          </a:p>
-          <a:p>
-            <a:r>
-              <a:rPr lang="en-US" sz="1900" dirty="0" smtClean="0">
+              <a:t> ranking-after-game</a:t>
+            </a:r>
+          </a:p>
+          <a:p>
+            <a:r>
+              <a:rPr lang="en-US" dirty="0" smtClean="0">
                 <a:latin typeface="Monaco"/>
                 <a:cs typeface="Monaco"/>
               </a:rPr>
@@ -14524,7 +14427,7 @@
           </a:p>
           <a:p>
             <a:r>
-              <a:rPr lang="en-US" sz="1900" dirty="0" smtClean="0">
+              <a:rPr lang="en-US" dirty="0" smtClean="0">
                 <a:latin typeface="Monaco"/>
                 <a:cs typeface="Monaco"/>
               </a:rPr>
@@ -14533,43 +14436,246 @@
           </a:p>
           <a:p>
             <a:r>
-              <a:rPr lang="en-US" sz="1900" dirty="0" smtClean="0">
+              <a:rPr lang="en-US" dirty="0" smtClean="0">
                 <a:latin typeface="Monaco"/>
                 <a:cs typeface="Monaco"/>
               </a:rPr>
-              <a:t>     importance :importance}]</a:t>
-            </a:r>
-          </a:p>
-          <a:p>
-            <a:r>
-              <a:rPr lang="en-US" sz="1900" dirty="0" smtClean="0">
+              <a:t>     importance :importance</a:t>
+            </a:r>
+          </a:p>
+          <a:p>
+            <a:r>
+              <a:rPr lang="en-US" dirty="0" smtClean="0">
                 <a:latin typeface="Monaco"/>
                 <a:cs typeface="Monaco"/>
               </a:rPr>
-              <a:t>  (+ ranking</a:t>
-            </a:r>
-          </a:p>
-          <a:p>
-            <a:r>
-              <a:rPr lang="en-US" sz="1900" dirty="0" smtClean="0">
+              <a:t>     score :score}]</a:t>
+            </a:r>
+          </a:p>
+          <a:p>
+            <a:r>
+              <a:rPr lang="en-US" dirty="0" smtClean="0">
                 <a:latin typeface="Monaco"/>
                 <a:cs typeface="Monaco"/>
               </a:rPr>
-              <a:t>     (* importance</a:t>
-            </a:r>
-          </a:p>
-          <a:p>
-            <a:r>
-              <a:rPr lang="en-US" sz="1900" dirty="0" smtClean="0">
+              <a:t>  (+ ranking</a:t>
+            </a:r>
+          </a:p>
+          <a:p>
+            <a:r>
+              <a:rPr lang="en-US" dirty="0" smtClean="0">
                 <a:latin typeface="Monaco"/>
                 <a:cs typeface="Monaco"/>
               </a:rPr>
-              <a:t>        (- 0 (expected ranking opponent-ranking)))))</a:t>
-            </a:r>
-            <a:endParaRPr lang="en-US" sz="1900" dirty="0">
+              <a:t>     (* importance</a:t>
+            </a:r>
+          </a:p>
+          <a:p>
+            <a:r>
+              <a:rPr lang="en-US" dirty="0" smtClean="0">
+                <a:latin typeface="Monaco"/>
+                <a:cs typeface="Monaco"/>
+              </a:rPr>
+              <a:t>        (- score (expected ranking opponent-ranking)))))</a:t>
+            </a:r>
+          </a:p>
+          <a:p>
+            <a:endParaRPr lang="en-US" sz="1200" dirty="0" smtClean="0">
               <a:latin typeface="Monaco"/>
               <a:cs typeface="Monaco"/>
             </a:endParaRPr>
+          </a:p>
+          <a:p>
+            <a:r>
+              <a:rPr lang="en-US" dirty="0" smtClean="0">
+                <a:latin typeface="Monaco"/>
+                <a:cs typeface="Monaco"/>
+              </a:rPr>
+              <a:t>(</a:t>
+            </a:r>
+            <a:r>
+              <a:rPr lang="en-US" dirty="0" err="1" smtClean="0">
+                <a:latin typeface="Monaco"/>
+                <a:cs typeface="Monaco"/>
+              </a:rPr>
+              <a:t>defn</a:t>
+            </a:r>
+            <a:r>
+              <a:rPr lang="en-US" dirty="0" smtClean="0">
+                <a:latin typeface="Monaco"/>
+                <a:cs typeface="Monaco"/>
+              </a:rPr>
+              <a:t> ranking-after-win [</a:t>
+            </a:r>
+            <a:r>
+              <a:rPr lang="en-US" dirty="0" err="1" smtClean="0">
+                <a:latin typeface="Monaco"/>
+                <a:cs typeface="Monaco"/>
+              </a:rPr>
+              <a:t>args</a:t>
+            </a:r>
+            <a:r>
+              <a:rPr lang="en-US" dirty="0" smtClean="0">
+                <a:latin typeface="Monaco"/>
+                <a:cs typeface="Monaco"/>
+              </a:rPr>
+              <a:t>]</a:t>
+            </a:r>
+          </a:p>
+          <a:p>
+            <a:r>
+              <a:rPr lang="en-US" dirty="0" smtClean="0">
+                <a:latin typeface="Monaco"/>
+                <a:cs typeface="Monaco"/>
+              </a:rPr>
+              <a:t>  (ranking-after-game (merge </a:t>
+            </a:r>
+            <a:r>
+              <a:rPr lang="en-US" dirty="0" err="1" smtClean="0">
+                <a:latin typeface="Monaco"/>
+                <a:cs typeface="Monaco"/>
+              </a:rPr>
+              <a:t>args</a:t>
+            </a:r>
+            <a:r>
+              <a:rPr lang="en-US" dirty="0" smtClean="0">
+                <a:latin typeface="Monaco"/>
+                <a:cs typeface="Monaco"/>
+              </a:rPr>
+              <a:t> {:score 1})))</a:t>
+            </a:r>
+          </a:p>
+          <a:p>
+            <a:endParaRPr lang="en-US" sz="1200" dirty="0" smtClean="0">
+              <a:latin typeface="Monaco"/>
+              <a:cs typeface="Monaco"/>
+            </a:endParaRPr>
+          </a:p>
+          <a:p>
+            <a:r>
+              <a:rPr lang="en-US" dirty="0" smtClean="0">
+                <a:latin typeface="Monaco"/>
+                <a:cs typeface="Monaco"/>
+              </a:rPr>
+              <a:t>(</a:t>
+            </a:r>
+            <a:r>
+              <a:rPr lang="en-US" dirty="0" err="1" smtClean="0">
+                <a:latin typeface="Monaco"/>
+                <a:cs typeface="Monaco"/>
+              </a:rPr>
+              <a:t>defn</a:t>
+            </a:r>
+            <a:r>
+              <a:rPr lang="en-US" dirty="0" smtClean="0">
+                <a:latin typeface="Monaco"/>
+                <a:cs typeface="Monaco"/>
+              </a:rPr>
+              <a:t> ranking-after-win [</a:t>
+            </a:r>
+            <a:r>
+              <a:rPr lang="en-US" dirty="0" err="1" smtClean="0">
+                <a:latin typeface="Monaco"/>
+                <a:cs typeface="Monaco"/>
+              </a:rPr>
+              <a:t>args</a:t>
+            </a:r>
+            <a:r>
+              <a:rPr lang="en-US" dirty="0" smtClean="0">
+                <a:latin typeface="Monaco"/>
+                <a:cs typeface="Monaco"/>
+              </a:rPr>
+              <a:t>]</a:t>
+            </a:r>
+          </a:p>
+          <a:p>
+            <a:r>
+              <a:rPr lang="en-US" dirty="0" smtClean="0">
+                <a:latin typeface="Monaco"/>
+                <a:cs typeface="Monaco"/>
+              </a:rPr>
+              <a:t>  (ranking-after-game (merge </a:t>
+            </a:r>
+            <a:r>
+              <a:rPr lang="en-US" dirty="0" err="1" smtClean="0">
+                <a:latin typeface="Monaco"/>
+                <a:cs typeface="Monaco"/>
+              </a:rPr>
+              <a:t>args</a:t>
+            </a:r>
+            <a:r>
+              <a:rPr lang="en-US" dirty="0" smtClean="0">
+                <a:latin typeface="Monaco"/>
+                <a:cs typeface="Monaco"/>
+              </a:rPr>
+              <a:t> {:score 0})))</a:t>
+            </a:r>
+          </a:p>
+          <a:p>
+            <a:endParaRPr lang="en-US" sz="1200" dirty="0" smtClean="0">
+              <a:latin typeface="Monaco"/>
+              <a:cs typeface="Monaco"/>
+            </a:endParaRPr>
+          </a:p>
+          <a:p>
+            <a:r>
+              <a:rPr lang="en-US" dirty="0" smtClean="0">
+                <a:latin typeface="Monaco"/>
+                <a:cs typeface="Monaco"/>
+              </a:rPr>
+              <a:t>(</a:t>
+            </a:r>
+            <a:r>
+              <a:rPr lang="en-US" dirty="0" err="1" smtClean="0">
+                <a:latin typeface="Monaco"/>
+                <a:cs typeface="Monaco"/>
+              </a:rPr>
+              <a:t>defn</a:t>
+            </a:r>
+            <a:r>
+              <a:rPr lang="en-US" dirty="0" smtClean="0">
+                <a:latin typeface="Monaco"/>
+                <a:cs typeface="Monaco"/>
+              </a:rPr>
+              <a:t> ranking-after-draw [</a:t>
+            </a:r>
+            <a:r>
+              <a:rPr lang="en-US" dirty="0" err="1" smtClean="0">
+                <a:latin typeface="Monaco"/>
+                <a:cs typeface="Monaco"/>
+              </a:rPr>
+              <a:t>args</a:t>
+            </a:r>
+            <a:r>
+              <a:rPr lang="en-US" dirty="0" smtClean="0">
+                <a:latin typeface="Monaco"/>
+                <a:cs typeface="Monaco"/>
+              </a:rPr>
+              <a:t>]</a:t>
+            </a:r>
+          </a:p>
+          <a:p>
+            <a:r>
+              <a:rPr lang="en-US" dirty="0" smtClean="0">
+                <a:latin typeface="Monaco"/>
+                <a:cs typeface="Monaco"/>
+              </a:rPr>
+              <a:t>  (ranking-after-game (merge </a:t>
+            </a:r>
+            <a:r>
+              <a:rPr lang="en-US" dirty="0" err="1" smtClean="0">
+                <a:latin typeface="Monaco"/>
+                <a:cs typeface="Monaco"/>
+              </a:rPr>
+              <a:t>args</a:t>
+            </a:r>
+            <a:r>
+              <a:rPr lang="en-US" dirty="0" smtClean="0">
+                <a:latin typeface="Monaco"/>
+                <a:cs typeface="Monaco"/>
+              </a:rPr>
+              <a:t> {:score 0.5})))</a:t>
+            </a:r>
           </a:p>
         </p:txBody>
       </p:sp>
@@ -14746,7 +14852,7 @@
       </p:sp>
       <p:pic>
         <p:nvPicPr>
-          <p:cNvPr id="12" name="Picture 11"/>
+          <p:cNvPr id="14" name="Picture 13"/>
           <p:cNvPicPr>
             <a:picLocks noChangeAspect="1"/>
           </p:cNvPicPr>
@@ -14760,8 +14866,8 @@
         </p:blipFill>
         <p:spPr>
           <a:xfrm>
-            <a:off x="0" y="1308100"/>
-            <a:ext cx="9144000" cy="3717590"/>
+            <a:off x="0" y="1224640"/>
+            <a:ext cx="9144000" cy="3670287"/>
           </a:xfrm>
           <a:prstGeom prst="rect">
             <a:avLst/>
@@ -14887,7 +14993,7 @@
       </p:sp>
       <p:pic>
         <p:nvPicPr>
-          <p:cNvPr id="6" name="Picture 5"/>
+          <p:cNvPr id="10" name="Picture 9"/>
           <p:cNvPicPr>
             <a:picLocks noChangeAspect="1"/>
           </p:cNvPicPr>
@@ -14901,8 +15007,8 @@
         </p:blipFill>
         <p:spPr>
           <a:xfrm>
-            <a:off x="0" y="1409700"/>
-            <a:ext cx="9144000" cy="3524250"/>
+            <a:off x="0" y="1440543"/>
+            <a:ext cx="9144000" cy="3498273"/>
           </a:xfrm>
           <a:prstGeom prst="rect">
             <a:avLst/>
@@ -15028,7 +15134,7 @@
       </p:sp>
       <p:pic>
         <p:nvPicPr>
-          <p:cNvPr id="5" name="Picture 4"/>
+          <p:cNvPr id="2" name="Picture 1"/>
           <p:cNvPicPr>
             <a:picLocks noChangeAspect="1"/>
           </p:cNvPicPr>
@@ -15042,8 +15148,8 @@
         </p:blipFill>
         <p:spPr>
           <a:xfrm>
-            <a:off x="0" y="1876425"/>
-            <a:ext cx="9144000" cy="2309880"/>
+            <a:off x="0" y="2075540"/>
+            <a:ext cx="9144000" cy="1963204"/>
           </a:xfrm>
           <a:prstGeom prst="rect">
             <a:avLst/>
@@ -15053,7 +15159,7 @@
     </p:spTree>
     <p:extLst>
       <p:ext uri="{BB962C8B-B14F-4D97-AF65-F5344CB8AC3E}">
-        <p14:creationId xmlns:p14="http://schemas.microsoft.com/office/powerpoint/2010/main" val="3159410085"/>
+        <p14:creationId xmlns:p14="http://schemas.microsoft.com/office/powerpoint/2010/main" val="3525854038"/>
       </p:ext>
     </p:extLst>
   </p:cSld>
@@ -15346,7 +15452,7 @@
       </p:sp>
       <p:pic>
         <p:nvPicPr>
-          <p:cNvPr id="4" name="Picture 3"/>
+          <p:cNvPr id="5" name="Picture 4"/>
           <p:cNvPicPr>
             <a:picLocks noChangeAspect="1"/>
           </p:cNvPicPr>
@@ -15360,8 +15466,8 @@
         </p:blipFill>
         <p:spPr>
           <a:xfrm>
-            <a:off x="0" y="1104900"/>
-            <a:ext cx="9144000" cy="3996267"/>
+            <a:off x="0" y="888997"/>
+            <a:ext cx="9144000" cy="4303690"/>
           </a:xfrm>
           <a:prstGeom prst="rect">
             <a:avLst/>
@@ -15487,7 +15593,7 @@
       </p:sp>
       <p:pic>
         <p:nvPicPr>
-          <p:cNvPr id="5" name="Picture 4"/>
+          <p:cNvPr id="6" name="Picture 5"/>
           <p:cNvPicPr>
             <a:picLocks noChangeAspect="1"/>
           </p:cNvPicPr>
@@ -15501,8 +15607,8 @@
         </p:blipFill>
         <p:spPr>
           <a:xfrm>
-            <a:off x="0" y="1390650"/>
-            <a:ext cx="9144000" cy="3368842"/>
+            <a:off x="0" y="1382483"/>
+            <a:ext cx="9144000" cy="3388216"/>
           </a:xfrm>
           <a:prstGeom prst="rect">
             <a:avLst/>
@@ -15628,7 +15734,7 @@
       </p:sp>
       <p:pic>
         <p:nvPicPr>
-          <p:cNvPr id="2" name="Picture 1"/>
+          <p:cNvPr id="4" name="Picture 3"/>
           <p:cNvPicPr>
             <a:picLocks noChangeAspect="1"/>
           </p:cNvPicPr>
@@ -15642,8 +15748,8 @@
         </p:blipFill>
         <p:spPr>
           <a:xfrm>
-            <a:off x="0" y="1343025"/>
-            <a:ext cx="9144000" cy="3489614"/>
+            <a:off x="0" y="1295397"/>
+            <a:ext cx="9144000" cy="3494190"/>
           </a:xfrm>
           <a:prstGeom prst="rect">
             <a:avLst/>

</xml_diff>